<commit_message>
Updated presentation, changed how id is generated
</commit_message>
<xml_diff>
--- a/GolfGreens/Docs/Pack Mules Game Engine Presentation.pptx
+++ b/GolfGreens/Docs/Pack Mules Game Engine Presentation.pptx
@@ -11,7 +11,10 @@
     <p:sldId id="261" r:id="rId5"/>
     <p:sldId id="260" r:id="rId6"/>
     <p:sldId id="262" r:id="rId7"/>
-    <p:sldId id="259" r:id="rId8"/>
+    <p:sldId id="263" r:id="rId8"/>
+    <p:sldId id="264" r:id="rId9"/>
+    <p:sldId id="265" r:id="rId10"/>
+    <p:sldId id="259" r:id="rId11"/>
   </p:sldIdLst>
   <p:sldSz cx="12192000" cy="6858000"/>
   <p:notesSz cx="6858000" cy="9144000"/>
@@ -7736,11 +7739,7 @@
           <a:p>
             <a:r>
               <a:rPr lang="en-US" sz="2800" dirty="0" smtClean="0"/>
-              <a:t>by </a:t>
-            </a:r>
-            <a:r>
-              <a:rPr lang="en-US" sz="2800" dirty="0" smtClean="0"/>
-              <a:t>Pack Mules</a:t>
+              <a:t>by Pack Mules</a:t>
             </a:r>
           </a:p>
           <a:p>
@@ -7829,6 +7828,137 @@
 </p:sld>
 </file>
 
+<file path=ppt/slides/slide10.xml><?xml version="1.0" encoding="utf-8"?>
+<p:sld xmlns:a="http://schemas.openxmlformats.org/drawingml/2006/main" xmlns:r="http://schemas.openxmlformats.org/officeDocument/2006/relationships" xmlns:p="http://schemas.openxmlformats.org/presentationml/2006/main">
+  <p:cSld>
+    <p:spTree>
+      <p:nvGrpSpPr>
+        <p:cNvPr id="1" name=""/>
+        <p:cNvGrpSpPr/>
+        <p:nvPr/>
+      </p:nvGrpSpPr>
+      <p:grpSpPr>
+        <a:xfrm>
+          <a:off x="0" y="0"/>
+          <a:ext cx="0" cy="0"/>
+          <a:chOff x="0" y="0"/>
+          <a:chExt cx="0" cy="0"/>
+        </a:xfrm>
+      </p:grpSpPr>
+      <p:sp>
+        <p:nvSpPr>
+          <p:cNvPr id="2" name="Title 1"/>
+          <p:cNvSpPr>
+            <a:spLocks noGrp="1"/>
+          </p:cNvSpPr>
+          <p:nvPr>
+            <p:ph type="title"/>
+          </p:nvPr>
+        </p:nvSpPr>
+        <p:spPr/>
+        <p:txBody>
+          <a:bodyPr/>
+          <a:lstStyle/>
+          <a:p>
+            <a:r>
+              <a:rPr lang="en-US" dirty="0" smtClean="0"/>
+              <a:t>What else can this engine be used for?</a:t>
+            </a:r>
+            <a:endParaRPr lang="en-CA" dirty="0"/>
+          </a:p>
+        </p:txBody>
+      </p:sp>
+      <p:sp>
+        <p:nvSpPr>
+          <p:cNvPr id="3" name="Content Placeholder 2"/>
+          <p:cNvSpPr>
+            <a:spLocks noGrp="1"/>
+          </p:cNvSpPr>
+          <p:nvPr>
+            <p:ph idx="1"/>
+          </p:nvPr>
+        </p:nvSpPr>
+        <p:spPr>
+          <a:xfrm>
+            <a:off x="2589212" y="2133600"/>
+            <a:ext cx="8915400" cy="4651248"/>
+          </a:xfrm>
+        </p:spPr>
+        <p:txBody>
+          <a:bodyPr>
+            <a:normAutofit/>
+          </a:bodyPr>
+          <a:lstStyle/>
+          <a:p>
+            <a:r>
+              <a:rPr lang="en-US" sz="2400" dirty="0" smtClean="0"/>
+              <a:t>Anything with simple collisions with shapes of rectangles or circles</a:t>
+            </a:r>
+          </a:p>
+          <a:p>
+            <a:endParaRPr lang="en-US" sz="2400" dirty="0"/>
+          </a:p>
+          <a:p>
+            <a:r>
+              <a:rPr lang="en-US" sz="2400" dirty="0" smtClean="0"/>
+              <a:t>Most simple 2D Games</a:t>
+            </a:r>
+          </a:p>
+          <a:p>
+            <a:pPr lvl="1"/>
+            <a:r>
+              <a:rPr lang="en-US" sz="2200" dirty="0" smtClean="0"/>
+              <a:t>Pong</a:t>
+            </a:r>
+          </a:p>
+          <a:p>
+            <a:pPr lvl="1"/>
+            <a:r>
+              <a:rPr lang="en-US" sz="2200" smtClean="0"/>
+              <a:t>Brick Breaker</a:t>
+            </a:r>
+            <a:endParaRPr lang="en-US" sz="2200" dirty="0" smtClean="0"/>
+          </a:p>
+          <a:p>
+            <a:pPr lvl="1"/>
+            <a:r>
+              <a:rPr lang="en-US" sz="2200" dirty="0" smtClean="0"/>
+              <a:t>Pool</a:t>
+            </a:r>
+          </a:p>
+          <a:p>
+            <a:pPr lvl="1"/>
+            <a:endParaRPr lang="en-US" sz="2200" dirty="0"/>
+          </a:p>
+          <a:p>
+            <a:r>
+              <a:rPr lang="en-US" sz="2400" dirty="0" smtClean="0"/>
+              <a:t>Possibility of platformers</a:t>
+            </a:r>
+            <a:endParaRPr lang="en-CA" sz="2400" dirty="0"/>
+          </a:p>
+        </p:txBody>
+      </p:sp>
+    </p:spTree>
+    <p:extLst>
+      <p:ext uri="{BB962C8B-B14F-4D97-AF65-F5344CB8AC3E}">
+        <p14:creationId xmlns:p14="http://schemas.microsoft.com/office/powerpoint/2010/main" val="4110120155"/>
+      </p:ext>
+    </p:extLst>
+  </p:cSld>
+  <p:clrMapOvr>
+    <a:masterClrMapping/>
+  </p:clrMapOvr>
+  <p:timing>
+    <p:tnLst>
+      <p:par>
+        <p:cTn id="1" dur="indefinite" restart="never" nodeType="tmRoot"/>
+      </p:par>
+    </p:tnLst>
+  </p:timing>
+</p:sld>
+</file>
+
 <file path=ppt/slides/slide2.xml><?xml version="1.0" encoding="utf-8"?>
 <p:sld xmlns:a="http://schemas.openxmlformats.org/drawingml/2006/main" xmlns:r="http://schemas.openxmlformats.org/officeDocument/2006/relationships" xmlns:p="http://schemas.openxmlformats.org/presentationml/2006/main">
   <p:cSld>
@@ -7884,7 +8014,7 @@
         <p:spPr>
           <a:xfrm>
             <a:off x="2589212" y="2133600"/>
-            <a:ext cx="8915400" cy="3910584"/>
+            <a:ext cx="8915400" cy="4395216"/>
           </a:xfrm>
         </p:spPr>
         <p:txBody>
@@ -7895,32 +8025,16 @@
           <a:p>
             <a:r>
               <a:rPr lang="en-US" sz="2400" dirty="0" smtClean="0"/>
-              <a:t>A </a:t>
-            </a:r>
+              <a:t>A 2D engine</a:t>
+            </a:r>
+          </a:p>
+          <a:p>
+            <a:endParaRPr lang="en-US" sz="2400" dirty="0"/>
+          </a:p>
+          <a:p>
             <a:r>
               <a:rPr lang="en-US" sz="2400" dirty="0" smtClean="0"/>
-              <a:t>2D  engine</a:t>
-            </a:r>
-            <a:endParaRPr lang="en-US" sz="2400" dirty="0" smtClean="0"/>
-          </a:p>
-          <a:p>
-            <a:endParaRPr lang="en-US" sz="2400" dirty="0"/>
-          </a:p>
-          <a:p>
-            <a:r>
-              <a:rPr lang="en-US" sz="2400" dirty="0" smtClean="0"/>
-              <a:t>Focuses mostly on collision and </a:t>
-            </a:r>
-            <a:r>
-              <a:rPr lang="en-US" sz="2400" dirty="0" smtClean="0"/>
-              <a:t>physics</a:t>
-            </a:r>
-          </a:p>
-          <a:p>
-            <a:pPr lvl="1"/>
-            <a:r>
-              <a:rPr lang="en-US" sz="2200" dirty="0" smtClean="0"/>
-              <a:t>Rectangle &amp; Circle shapes</a:t>
+              <a:t>Focuses mostly on collision and physics</a:t>
             </a:r>
           </a:p>
           <a:p>
@@ -7929,13 +8043,17 @@
           </a:p>
           <a:p>
             <a:r>
-              <a:rPr lang="en-US" sz="2400" dirty="0" err="1" smtClean="0"/>
+              <a:rPr lang="en-US" sz="2400" dirty="0" smtClean="0"/>
+              <a:t>Component structure similar to Unity</a:t>
+            </a:r>
+          </a:p>
+          <a:p>
+            <a:pPr lvl="1"/>
+            <a:r>
+              <a:rPr lang="en-US" sz="2200" dirty="0" err="1" smtClean="0"/>
               <a:t>GameObject</a:t>
             </a:r>
-            <a:r>
-              <a:rPr lang="en-US" sz="2400" dirty="0" smtClean="0"/>
-              <a:t> hierarchy similar to Unity</a:t>
-            </a:r>
+            <a:endParaRPr lang="en-US" sz="2200" dirty="0" smtClean="0"/>
           </a:p>
           <a:p>
             <a:pPr lvl="1"/>
@@ -8010,11 +8128,7 @@
           <a:p>
             <a:r>
               <a:rPr lang="en-US" sz="5400" dirty="0" smtClean="0"/>
-              <a:t>Golf </a:t>
-            </a:r>
-            <a:r>
-              <a:rPr lang="en-US" sz="5400" dirty="0" smtClean="0"/>
-              <a:t>Greens</a:t>
+              <a:t>Golf Greens</a:t>
             </a:r>
             <a:endParaRPr lang="en-CA" sz="5400" dirty="0"/>
           </a:p>
@@ -8048,17 +8162,8 @@
           <a:p>
             <a:r>
               <a:rPr lang="en-US" sz="2400" dirty="0" smtClean="0"/>
-              <a:t>Currently </a:t>
-            </a:r>
-            <a:r>
-              <a:rPr lang="en-US" sz="2400" dirty="0" smtClean="0"/>
-              <a:t>a 2-Player </a:t>
-            </a:r>
-            <a:r>
-              <a:rPr lang="en-US" sz="2400" dirty="0" smtClean="0"/>
-              <a:t>game</a:t>
-            </a:r>
-            <a:endParaRPr lang="en-US" sz="2400" dirty="0" smtClean="0"/>
+              <a:t>Currently a 2-Player game</a:t>
+            </a:r>
           </a:p>
         </p:txBody>
       </p:sp>
@@ -8153,6 +8258,13 @@
   <p:clrMapOvr>
     <a:masterClrMapping/>
   </p:clrMapOvr>
+  <p:timing>
+    <p:tnLst>
+      <p:par>
+        <p:cTn id="1" dur="indefinite" restart="never" nodeType="tmRoot"/>
+      </p:par>
+    </p:tnLst>
+  </p:timing>
 </p:sld>
 </file>
 
@@ -8339,6 +8451,13 @@
   <p:clrMapOvr>
     <a:masterClrMapping/>
   </p:clrMapOvr>
+  <p:timing>
+    <p:tnLst>
+      <p:par>
+        <p:cTn id="1" dur="indefinite" restart="never" nodeType="tmRoot"/>
+      </p:par>
+    </p:tnLst>
+  </p:timing>
 </p:sld>
 </file>
 
@@ -8376,7 +8495,7 @@
           <a:p>
             <a:r>
               <a:rPr lang="en-US" dirty="0" smtClean="0"/>
-              <a:t>What else can this engine be used for?</a:t>
+              <a:t>Advantages</a:t>
             </a:r>
             <a:endParaRPr lang="en-CA" dirty="0"/>
           </a:p>
@@ -8392,12 +8511,7 @@
             <p:ph idx="1"/>
           </p:nvPr>
         </p:nvSpPr>
-        <p:spPr>
-          <a:xfrm>
-            <a:off x="2589212" y="2133600"/>
-            <a:ext cx="8915400" cy="4651248"/>
-          </a:xfrm>
-        </p:spPr>
+        <p:spPr/>
         <p:txBody>
           <a:bodyPr>
             <a:normAutofit/>
@@ -8406,38 +8520,14 @@
           <a:p>
             <a:r>
               <a:rPr lang="en-US" sz="2400" dirty="0" smtClean="0"/>
-              <a:t>Anything with simple collisions with shapes of rectangles or circles</a:t>
-            </a:r>
-          </a:p>
-          <a:p>
-            <a:endParaRPr lang="en-US" sz="2400" dirty="0"/>
-          </a:p>
-          <a:p>
-            <a:r>
-              <a:rPr lang="en-US" sz="2400" dirty="0" smtClean="0"/>
-              <a:t>Most simple 2D Games</a:t>
+              <a:t>Physics Collision</a:t>
             </a:r>
           </a:p>
           <a:p>
             <a:pPr lvl="1"/>
             <a:r>
               <a:rPr lang="en-US" sz="2200" dirty="0" smtClean="0"/>
-              <a:t>Pong</a:t>
-            </a:r>
-          </a:p>
-          <a:p>
-            <a:pPr lvl="1"/>
-            <a:r>
-              <a:rPr lang="en-US" sz="2200" smtClean="0"/>
-              <a:t>Brick Breaker</a:t>
-            </a:r>
-            <a:endParaRPr lang="en-US" sz="2200" dirty="0" smtClean="0"/>
-          </a:p>
-          <a:p>
-            <a:pPr lvl="1"/>
-            <a:r>
-              <a:rPr lang="en-US" sz="2200" dirty="0" smtClean="0"/>
-              <a:t>Pool</a:t>
+              <a:t>Circle &amp; Rectangle Shapes</a:t>
             </a:r>
           </a:p>
           <a:p>
@@ -8447,16 +8537,228 @@
           <a:p>
             <a:r>
               <a:rPr lang="en-US" sz="2400" dirty="0" smtClean="0"/>
-              <a:t>Possibility of platformers</a:t>
-            </a:r>
-            <a:endParaRPr lang="en-CA" sz="2400" dirty="0"/>
+              <a:t>Audio Implementation</a:t>
+            </a:r>
+          </a:p>
+          <a:p>
+            <a:endParaRPr lang="en-US" sz="2400" dirty="0"/>
+          </a:p>
+          <a:p>
+            <a:r>
+              <a:rPr lang="en-US" sz="2400" dirty="0" err="1" smtClean="0"/>
+              <a:t>GameObject</a:t>
+            </a:r>
+            <a:r>
+              <a:rPr lang="en-US" sz="2400" dirty="0" smtClean="0"/>
+              <a:t> structure easy to understand</a:t>
+            </a:r>
           </a:p>
         </p:txBody>
       </p:sp>
     </p:spTree>
     <p:extLst>
       <p:ext uri="{BB962C8B-B14F-4D97-AF65-F5344CB8AC3E}">
-        <p14:creationId xmlns:p14="http://schemas.microsoft.com/office/powerpoint/2010/main" val="4110120155"/>
+        <p14:creationId xmlns:p14="http://schemas.microsoft.com/office/powerpoint/2010/main" val="1641108704"/>
+      </p:ext>
+    </p:extLst>
+  </p:cSld>
+  <p:clrMapOvr>
+    <a:masterClrMapping/>
+  </p:clrMapOvr>
+  <p:timing>
+    <p:tnLst>
+      <p:par>
+        <p:cTn id="1" dur="indefinite" restart="never" nodeType="tmRoot"/>
+      </p:par>
+    </p:tnLst>
+  </p:timing>
+</p:sld>
+</file>
+
+<file path=ppt/slides/slide8.xml><?xml version="1.0" encoding="utf-8"?>
+<p:sld xmlns:a="http://schemas.openxmlformats.org/drawingml/2006/main" xmlns:r="http://schemas.openxmlformats.org/officeDocument/2006/relationships" xmlns:p="http://schemas.openxmlformats.org/presentationml/2006/main">
+  <p:cSld>
+    <p:spTree>
+      <p:nvGrpSpPr>
+        <p:cNvPr id="1" name=""/>
+        <p:cNvGrpSpPr/>
+        <p:nvPr/>
+      </p:nvGrpSpPr>
+      <p:grpSpPr>
+        <a:xfrm>
+          <a:off x="0" y="0"/>
+          <a:ext cx="0" cy="0"/>
+          <a:chOff x="0" y="0"/>
+          <a:chExt cx="0" cy="0"/>
+        </a:xfrm>
+      </p:grpSpPr>
+      <p:sp>
+        <p:nvSpPr>
+          <p:cNvPr id="2" name="Title 1"/>
+          <p:cNvSpPr>
+            <a:spLocks noGrp="1"/>
+          </p:cNvSpPr>
+          <p:nvPr>
+            <p:ph type="title"/>
+          </p:nvPr>
+        </p:nvSpPr>
+        <p:spPr/>
+        <p:txBody>
+          <a:bodyPr/>
+          <a:lstStyle/>
+          <a:p>
+            <a:r>
+              <a:rPr lang="en-US" dirty="0" smtClean="0"/>
+              <a:t>Disadvantages</a:t>
+            </a:r>
+            <a:endParaRPr lang="en-CA" dirty="0"/>
+          </a:p>
+        </p:txBody>
+      </p:sp>
+      <p:sp>
+        <p:nvSpPr>
+          <p:cNvPr id="3" name="Content Placeholder 2"/>
+          <p:cNvSpPr>
+            <a:spLocks noGrp="1"/>
+          </p:cNvSpPr>
+          <p:nvPr>
+            <p:ph idx="1"/>
+          </p:nvPr>
+        </p:nvSpPr>
+        <p:spPr/>
+        <p:txBody>
+          <a:bodyPr>
+            <a:normAutofit/>
+          </a:bodyPr>
+          <a:lstStyle/>
+          <a:p>
+            <a:r>
+              <a:rPr lang="en-US" sz="2400" dirty="0" smtClean="0"/>
+              <a:t>No XML/JSON, objects are hard coded</a:t>
+            </a:r>
+          </a:p>
+          <a:p>
+            <a:endParaRPr lang="en-US" sz="2400" dirty="0" smtClean="0"/>
+          </a:p>
+          <a:p>
+            <a:r>
+              <a:rPr lang="en-US" sz="2400" dirty="0" smtClean="0"/>
+              <a:t>Only circles &amp; rectangles </a:t>
+            </a:r>
+            <a:endParaRPr lang="en-US" sz="2400" dirty="0" smtClean="0"/>
+          </a:p>
+          <a:p>
+            <a:pPr lvl="1"/>
+            <a:endParaRPr lang="en-US" sz="2200" dirty="0"/>
+          </a:p>
+          <a:p>
+            <a:endParaRPr lang="en-CA" sz="2400" dirty="0"/>
+          </a:p>
+        </p:txBody>
+      </p:sp>
+    </p:spTree>
+    <p:extLst>
+      <p:ext uri="{BB962C8B-B14F-4D97-AF65-F5344CB8AC3E}">
+        <p14:creationId xmlns:p14="http://schemas.microsoft.com/office/powerpoint/2010/main" val="3807475192"/>
+      </p:ext>
+    </p:extLst>
+  </p:cSld>
+  <p:clrMapOvr>
+    <a:masterClrMapping/>
+  </p:clrMapOvr>
+  <p:timing>
+    <p:tnLst>
+      <p:par>
+        <p:cTn id="1" dur="indefinite" restart="never" nodeType="tmRoot"/>
+      </p:par>
+    </p:tnLst>
+  </p:timing>
+</p:sld>
+</file>
+
+<file path=ppt/slides/slide9.xml><?xml version="1.0" encoding="utf-8"?>
+<p:sld xmlns:a="http://schemas.openxmlformats.org/drawingml/2006/main" xmlns:r="http://schemas.openxmlformats.org/officeDocument/2006/relationships" xmlns:p="http://schemas.openxmlformats.org/presentationml/2006/main">
+  <p:cSld>
+    <p:spTree>
+      <p:nvGrpSpPr>
+        <p:cNvPr id="1" name=""/>
+        <p:cNvGrpSpPr/>
+        <p:nvPr/>
+      </p:nvGrpSpPr>
+      <p:grpSpPr>
+        <a:xfrm>
+          <a:off x="0" y="0"/>
+          <a:ext cx="0" cy="0"/>
+          <a:chOff x="0" y="0"/>
+          <a:chExt cx="0" cy="0"/>
+        </a:xfrm>
+      </p:grpSpPr>
+      <p:sp>
+        <p:nvSpPr>
+          <p:cNvPr id="2" name="Title 1"/>
+          <p:cNvSpPr>
+            <a:spLocks noGrp="1"/>
+          </p:cNvSpPr>
+          <p:nvPr>
+            <p:ph type="title"/>
+          </p:nvPr>
+        </p:nvSpPr>
+        <p:spPr/>
+        <p:txBody>
+          <a:bodyPr/>
+          <a:lstStyle/>
+          <a:p>
+            <a:r>
+              <a:rPr lang="en-US" dirty="0" smtClean="0"/>
+              <a:t>What could be improved next?</a:t>
+            </a:r>
+            <a:endParaRPr lang="en-CA" dirty="0"/>
+          </a:p>
+        </p:txBody>
+      </p:sp>
+      <p:sp>
+        <p:nvSpPr>
+          <p:cNvPr id="3" name="Content Placeholder 2"/>
+          <p:cNvSpPr>
+            <a:spLocks noGrp="1"/>
+          </p:cNvSpPr>
+          <p:nvPr>
+            <p:ph idx="1"/>
+          </p:nvPr>
+        </p:nvSpPr>
+        <p:spPr/>
+        <p:txBody>
+          <a:bodyPr>
+            <a:normAutofit/>
+          </a:bodyPr>
+          <a:lstStyle/>
+          <a:p>
+            <a:r>
+              <a:rPr lang="en-US" sz="2400" dirty="0" smtClean="0"/>
+              <a:t>Clean up the code</a:t>
+            </a:r>
+          </a:p>
+          <a:p>
+            <a:endParaRPr lang="en-US" sz="2400" dirty="0"/>
+          </a:p>
+          <a:p>
+            <a:r>
+              <a:rPr lang="en-US" sz="2400" dirty="0" smtClean="0"/>
+              <a:t>Implement XML/JSON loading for better scene building</a:t>
+            </a:r>
+          </a:p>
+          <a:p>
+            <a:endParaRPr lang="en-US" sz="2400" dirty="0"/>
+          </a:p>
+          <a:p>
+            <a:endParaRPr lang="en-CA" sz="2400" dirty="0"/>
+          </a:p>
+        </p:txBody>
+      </p:sp>
+    </p:spTree>
+    <p:extLst>
+      <p:ext uri="{BB962C8B-B14F-4D97-AF65-F5344CB8AC3E}">
+        <p14:creationId xmlns:p14="http://schemas.microsoft.com/office/powerpoint/2010/main" val="1242538294"/>
       </p:ext>
     </p:extLst>
   </p:cSld>

</xml_diff>